<commit_message>
modify ppt of Q4
</commit_message>
<xml_diff>
--- a/zyq/zyq-Q4.pptx
+++ b/zyq/zyq-Q4.pptx
@@ -4122,7 +4122,7 @@
         </p:blipFill>
         <p:spPr>
           <a:xfrm>
-            <a:off x="6914031" y="556979"/>
+            <a:off x="6948573" y="556977"/>
             <a:ext cx="6097119" cy="6109731"/>
           </a:xfrm>
           <a:prstGeom prst="rect">
@@ -4233,7 +4233,7 @@
                 </a:solidFill>
                 <a:latin typeface="Castellar" panose="020A0402060406010301" pitchFamily="18" charset="0"/>
               </a:rPr>
-              <a:t>People prefer cheaper apps (paid)</a:t>
+              <a:t>People prefer cheaper apps</a:t>
             </a:r>
             <a:endParaRPr lang="zh-CN" altLang="en-US" sz="3200" dirty="0">
               <a:solidFill>
@@ -4260,8 +4260,8 @@
         </p:nvSpPr>
         <p:spPr>
           <a:xfrm>
-            <a:off x="4706519" y="6073821"/>
-            <a:ext cx="2340106" cy="646331"/>
+            <a:off x="4760113" y="6004169"/>
+            <a:ext cx="2340106" cy="923330"/>
           </a:xfrm>
           <a:prstGeom prst="rect">
             <a:avLst/>
@@ -4282,7 +4282,7 @@
                 </a:solidFill>
                 <a:latin typeface="Castellar" panose="020A0402060406010301" pitchFamily="18" charset="0"/>
               </a:rPr>
-              <a:t>free apps dominate</a:t>
+              <a:t>Most users download free apps</a:t>
             </a:r>
             <a:endParaRPr lang="zh-CN" altLang="en-US" dirty="0">
               <a:solidFill>
@@ -4350,8 +4350,8 @@
         </p:nvSpPr>
         <p:spPr>
           <a:xfrm>
-            <a:off x="6097120" y="246931"/>
-            <a:ext cx="2025569" cy="918960"/>
+            <a:off x="5284460" y="246931"/>
+            <a:ext cx="2123337" cy="1477328"/>
           </a:xfrm>
           <a:prstGeom prst="rect">
             <a:avLst/>
@@ -4384,7 +4384,7 @@
           <a:p>
             <a:r>
               <a:rPr lang="en-US" altLang="zh-CN" dirty="0"/>
-              <a:t>Apps less than $5 account for 81.7% of total installations.</a:t>
+              <a:t>Apps less than $5 will probably receive 81.7% of rest installations.(free apps exclusive)</a:t>
             </a:r>
             <a:endParaRPr lang="zh-CN" altLang="en-US" dirty="0"/>
           </a:p>
@@ -4401,14 +4401,13 @@
           </p:cNvPr>
           <p:cNvCxnSpPr>
             <a:cxnSpLocks/>
-            <a:stCxn id="18" idx="2"/>
           </p:cNvCxnSpPr>
           <p:nvPr/>
         </p:nvCxnSpPr>
         <p:spPr>
           <a:xfrm rot="16200000" flipH="1">
-            <a:off x="6547363" y="1728432"/>
-            <a:ext cx="1260931" cy="135847"/>
+            <a:off x="6600057" y="1821901"/>
+            <a:ext cx="657702" cy="449811"/>
           </a:xfrm>
           <a:prstGeom prst="bentConnector3">
             <a:avLst>
@@ -4509,14 +4508,227 @@
             </a:r>
           </a:p>
           <a:p>
-            <a:pPr marL="800100" lvl="1" indent="-342900">
-              <a:buFont typeface="Arial" panose="020B0604020202020204" pitchFamily="34" charset="0"/>
-              <a:buChar char="•"/>
-            </a:pPr>
+            <a:pPr lvl="1"/>
             <a:r>
               <a:rPr lang="en-US" altLang="zh-CN" sz="2400" dirty="0"/>
-              <a:t>paid-services …</a:t>
-            </a:r>
+              <a:t>     paid-services …</a:t>
+            </a:r>
+          </a:p>
+        </p:txBody>
+      </p:sp>
+      <p:cxnSp>
+        <p:nvCxnSpPr>
+          <p:cNvPr id="32" name="连接符: 曲线 31">
+            <a:extLst>
+              <a:ext uri="{FF2B5EF4-FFF2-40B4-BE49-F238E27FC236}">
+                <a16:creationId xmlns:a16="http://schemas.microsoft.com/office/drawing/2014/main" id="{3CEAE78F-AB62-4FCD-B5E1-D7F87B38A077}"/>
+              </a:ext>
+            </a:extLst>
+          </p:cNvPr>
+          <p:cNvCxnSpPr/>
+          <p:nvPr/>
+        </p:nvCxnSpPr>
+        <p:spPr>
+          <a:xfrm flipV="1">
+            <a:off x="6251414" y="4444678"/>
+            <a:ext cx="613458" cy="413801"/>
+          </a:xfrm>
+          <a:prstGeom prst="curvedConnector3">
+            <a:avLst/>
+          </a:prstGeom>
+          <a:ln w="57150">
+            <a:tailEnd type="triangle"/>
+          </a:ln>
+        </p:spPr>
+        <p:style>
+          <a:lnRef idx="2">
+            <a:schemeClr val="accent4"/>
+          </a:lnRef>
+          <a:fillRef idx="0">
+            <a:schemeClr val="accent4"/>
+          </a:fillRef>
+          <a:effectRef idx="1">
+            <a:schemeClr val="accent4"/>
+          </a:effectRef>
+          <a:fontRef idx="minor">
+            <a:schemeClr val="tx1"/>
+          </a:fontRef>
+        </p:style>
+      </p:cxnSp>
+      <p:sp>
+        <p:nvSpPr>
+          <p:cNvPr id="41" name="文本框 40">
+            <a:extLst>
+              <a:ext uri="{FF2B5EF4-FFF2-40B4-BE49-F238E27FC236}">
+                <a16:creationId xmlns:a16="http://schemas.microsoft.com/office/drawing/2014/main" id="{ECB994B1-C8E1-4B62-973C-BD5B5BCFEB18}"/>
+              </a:ext>
+            </a:extLst>
+          </p:cNvPr>
+          <p:cNvSpPr txBox="1"/>
+          <p:nvPr/>
+        </p:nvSpPr>
+        <p:spPr>
+          <a:xfrm>
+            <a:off x="5134475" y="5535202"/>
+            <a:ext cx="468398" cy="369332"/>
+          </a:xfrm>
+          <a:prstGeom prst="rect">
+            <a:avLst/>
+          </a:prstGeom>
+          <a:noFill/>
+        </p:spPr>
+        <p:txBody>
+          <a:bodyPr wrap="none" rtlCol="0">
+            <a:spAutoFit/>
+          </a:bodyPr>
+          <a:lstStyle/>
+          <a:p>
+            <a:r>
+              <a:rPr lang="en-US" altLang="zh-CN" dirty="0">
+                <a:solidFill>
+                  <a:schemeClr val="bg1"/>
+                </a:solidFill>
+                <a:latin typeface="Castellar" panose="020A0402060406010301" pitchFamily="18" charset="0"/>
+              </a:rPr>
+              <a:t>$0</a:t>
+            </a:r>
+            <a:endParaRPr lang="zh-CN" altLang="en-US" dirty="0">
+              <a:solidFill>
+                <a:schemeClr val="bg1"/>
+              </a:solidFill>
+              <a:latin typeface="Castellar" panose="020A0402060406010301" pitchFamily="18" charset="0"/>
+            </a:endParaRPr>
+          </a:p>
+        </p:txBody>
+      </p:sp>
+      <p:cxnSp>
+        <p:nvCxnSpPr>
+          <p:cNvPr id="43" name="直接连接符 42">
+            <a:extLst>
+              <a:ext uri="{FF2B5EF4-FFF2-40B4-BE49-F238E27FC236}">
+                <a16:creationId xmlns:a16="http://schemas.microsoft.com/office/drawing/2014/main" id="{7445FD95-FBED-4287-B8FD-8C167D42E91D}"/>
+              </a:ext>
+            </a:extLst>
+          </p:cNvPr>
+          <p:cNvCxnSpPr/>
+          <p:nvPr/>
+        </p:nvCxnSpPr>
+        <p:spPr>
+          <a:xfrm>
+            <a:off x="5930166" y="4858479"/>
+            <a:ext cx="0" cy="1145690"/>
+          </a:xfrm>
+          <a:prstGeom prst="line">
+            <a:avLst/>
+          </a:prstGeom>
+          <a:ln>
+            <a:solidFill>
+              <a:srgbClr val="FF0000"/>
+            </a:solidFill>
+          </a:ln>
+        </p:spPr>
+        <p:style>
+          <a:lnRef idx="2">
+            <a:schemeClr val="accent2"/>
+          </a:lnRef>
+          <a:fillRef idx="0">
+            <a:schemeClr val="accent2"/>
+          </a:fillRef>
+          <a:effectRef idx="1">
+            <a:schemeClr val="accent2"/>
+          </a:effectRef>
+          <a:fontRef idx="minor">
+            <a:schemeClr val="tx1"/>
+          </a:fontRef>
+        </p:style>
+      </p:cxnSp>
+      <p:cxnSp>
+        <p:nvCxnSpPr>
+          <p:cNvPr id="55" name="直接连接符 54">
+            <a:extLst>
+              <a:ext uri="{FF2B5EF4-FFF2-40B4-BE49-F238E27FC236}">
+                <a16:creationId xmlns:a16="http://schemas.microsoft.com/office/drawing/2014/main" id="{8A23B374-24B8-4C8D-AFCC-728165829368}"/>
+              </a:ext>
+            </a:extLst>
+          </p:cNvPr>
+          <p:cNvCxnSpPr/>
+          <p:nvPr/>
+        </p:nvCxnSpPr>
+        <p:spPr>
+          <a:xfrm flipH="1">
+            <a:off x="5930166" y="4912749"/>
+            <a:ext cx="321248" cy="1091420"/>
+          </a:xfrm>
+          <a:prstGeom prst="line">
+            <a:avLst/>
+          </a:prstGeom>
+          <a:ln>
+            <a:solidFill>
+              <a:srgbClr val="FF0000"/>
+            </a:solidFill>
+          </a:ln>
+        </p:spPr>
+        <p:style>
+          <a:lnRef idx="2">
+            <a:schemeClr val="accent2"/>
+          </a:lnRef>
+          <a:fillRef idx="0">
+            <a:schemeClr val="accent2"/>
+          </a:fillRef>
+          <a:effectRef idx="1">
+            <a:schemeClr val="accent2"/>
+          </a:effectRef>
+          <a:fontRef idx="minor">
+            <a:schemeClr val="tx1"/>
+          </a:fontRef>
+        </p:style>
+      </p:cxnSp>
+      <p:sp>
+        <p:nvSpPr>
+          <p:cNvPr id="57" name="弧形 56">
+            <a:extLst>
+              <a:ext uri="{FF2B5EF4-FFF2-40B4-BE49-F238E27FC236}">
+                <a16:creationId xmlns:a16="http://schemas.microsoft.com/office/drawing/2014/main" id="{76B8C446-5480-4E17-8C06-751FBDF70BE0}"/>
+              </a:ext>
+            </a:extLst>
+          </p:cNvPr>
+          <p:cNvSpPr/>
+          <p:nvPr/>
+        </p:nvSpPr>
+        <p:spPr>
+          <a:xfrm rot="21247835">
+            <a:off x="5598860" y="4873465"/>
+            <a:ext cx="662610" cy="215584"/>
+          </a:xfrm>
+          <a:prstGeom prst="arc">
+            <a:avLst/>
+          </a:prstGeom>
+          <a:ln>
+            <a:solidFill>
+              <a:srgbClr val="FF0000"/>
+            </a:solidFill>
+          </a:ln>
+        </p:spPr>
+        <p:style>
+          <a:lnRef idx="2">
+            <a:schemeClr val="accent2"/>
+          </a:lnRef>
+          <a:fillRef idx="0">
+            <a:schemeClr val="accent2"/>
+          </a:fillRef>
+          <a:effectRef idx="1">
+            <a:schemeClr val="accent2"/>
+          </a:effectRef>
+          <a:fontRef idx="minor">
+            <a:schemeClr val="tx1"/>
+          </a:fontRef>
+        </p:style>
+        <p:txBody>
+          <a:bodyPr rtlCol="0" anchor="ctr"/>
+          <a:lstStyle/>
+          <a:p>
+            <a:pPr algn="ctr"/>
+            <a:endParaRPr lang="zh-CN" altLang="en-US"/>
           </a:p>
         </p:txBody>
       </p:sp>
@@ -4705,6 +4917,136 @@
           </a:p>
         </p:txBody>
       </p:sp>
+      <p:sp>
+        <p:nvSpPr>
+          <p:cNvPr id="4" name="椭圆 3">
+            <a:extLst>
+              <a:ext uri="{FF2B5EF4-FFF2-40B4-BE49-F238E27FC236}">
+                <a16:creationId xmlns:a16="http://schemas.microsoft.com/office/drawing/2014/main" id="{8E448852-0FEB-4E38-9E01-4577788FA700}"/>
+              </a:ext>
+            </a:extLst>
+          </p:cNvPr>
+          <p:cNvSpPr/>
+          <p:nvPr/>
+        </p:nvSpPr>
+        <p:spPr>
+          <a:xfrm>
+            <a:off x="7118431" y="937550"/>
+            <a:ext cx="4919240" cy="1158241"/>
+          </a:xfrm>
+          <a:prstGeom prst="ellipse">
+            <a:avLst/>
+          </a:prstGeom>
+          <a:noFill/>
+          <a:ln>
+            <a:solidFill>
+              <a:srgbClr val="FF0000"/>
+            </a:solidFill>
+          </a:ln>
+        </p:spPr>
+        <p:style>
+          <a:lnRef idx="1">
+            <a:schemeClr val="accent1"/>
+          </a:lnRef>
+          <a:fillRef idx="3">
+            <a:schemeClr val="accent1"/>
+          </a:fillRef>
+          <a:effectRef idx="2">
+            <a:schemeClr val="accent1"/>
+          </a:effectRef>
+          <a:fontRef idx="minor">
+            <a:schemeClr val="lt1"/>
+          </a:fontRef>
+        </p:style>
+        <p:txBody>
+          <a:bodyPr rtlCol="0" anchor="ctr"/>
+          <a:lstStyle/>
+          <a:p>
+            <a:pPr algn="ctr"/>
+            <a:endParaRPr lang="zh-CN" altLang="en-US"/>
+          </a:p>
+        </p:txBody>
+      </p:sp>
+      <p:sp>
+        <p:nvSpPr>
+          <p:cNvPr id="5" name="文本框 4">
+            <a:extLst>
+              <a:ext uri="{FF2B5EF4-FFF2-40B4-BE49-F238E27FC236}">
+                <a16:creationId xmlns:a16="http://schemas.microsoft.com/office/drawing/2014/main" id="{BCBB1C23-C61C-4F2D-B992-DDAD0F2ABD37}"/>
+              </a:ext>
+            </a:extLst>
+          </p:cNvPr>
+          <p:cNvSpPr txBox="1"/>
+          <p:nvPr/>
+        </p:nvSpPr>
+        <p:spPr>
+          <a:xfrm>
+            <a:off x="9676435" y="5324354"/>
+            <a:ext cx="2280213" cy="1200329"/>
+          </a:xfrm>
+          <a:prstGeom prst="rect">
+            <a:avLst/>
+          </a:prstGeom>
+          <a:noFill/>
+        </p:spPr>
+        <p:txBody>
+          <a:bodyPr wrap="square" rtlCol="0">
+            <a:spAutoFit/>
+          </a:bodyPr>
+          <a:lstStyle/>
+          <a:p>
+            <a:r>
+              <a:rPr lang="en-US" altLang="zh-CN" dirty="0"/>
+              <a:t>Paid apps with high installations are generally above the average.</a:t>
+            </a:r>
+            <a:endParaRPr lang="zh-CN" altLang="en-US" dirty="0"/>
+          </a:p>
+        </p:txBody>
+      </p:sp>
+      <p:cxnSp>
+        <p:nvCxnSpPr>
+          <p:cNvPr id="7" name="直接箭头连接符 6">
+            <a:extLst>
+              <a:ext uri="{FF2B5EF4-FFF2-40B4-BE49-F238E27FC236}">
+                <a16:creationId xmlns:a16="http://schemas.microsoft.com/office/drawing/2014/main" id="{B3BA6EAA-5015-4933-92BC-520D706A1961}"/>
+              </a:ext>
+            </a:extLst>
+          </p:cNvPr>
+          <p:cNvCxnSpPr>
+            <a:cxnSpLocks/>
+          </p:cNvCxnSpPr>
+          <p:nvPr/>
+        </p:nvCxnSpPr>
+        <p:spPr>
+          <a:xfrm flipH="1" flipV="1">
+            <a:off x="9925290" y="2157102"/>
+            <a:ext cx="445626" cy="3228563"/>
+          </a:xfrm>
+          <a:prstGeom prst="straightConnector1">
+            <a:avLst/>
+          </a:prstGeom>
+          <a:ln>
+            <a:solidFill>
+              <a:srgbClr val="FF0000"/>
+            </a:solidFill>
+            <a:tailEnd type="triangle"/>
+          </a:ln>
+        </p:spPr>
+        <p:style>
+          <a:lnRef idx="2">
+            <a:schemeClr val="accent1"/>
+          </a:lnRef>
+          <a:fillRef idx="0">
+            <a:schemeClr val="accent1"/>
+          </a:fillRef>
+          <a:effectRef idx="1">
+            <a:schemeClr val="accent1"/>
+          </a:effectRef>
+          <a:fontRef idx="minor">
+            <a:schemeClr val="tx1"/>
+          </a:fontRef>
+        </p:style>
+      </p:cxnSp>
     </p:spTree>
     <p:extLst>
       <p:ext uri="{BB962C8B-B14F-4D97-AF65-F5344CB8AC3E}">

</xml_diff>